<commit_message>
+Fixed Bugs +New ToDo
</commit_message>
<xml_diff>
--- a/PRG Presentation(RO).pptx
+++ b/PRG Presentation(RO).pptx
@@ -39,11 +39,15 @@
     <p:sldId id="288" r:id="rId33"/>
     <p:sldId id="289" r:id="rId34"/>
     <p:sldId id="290" r:id="rId35"/>
-    <p:sldId id="284" r:id="rId36"/>
-    <p:sldId id="291" r:id="rId37"/>
-    <p:sldId id="292" r:id="rId38"/>
-    <p:sldId id="293" r:id="rId39"/>
-    <p:sldId id="295" r:id="rId40"/>
+    <p:sldId id="299" r:id="rId36"/>
+    <p:sldId id="296" r:id="rId37"/>
+    <p:sldId id="297" r:id="rId38"/>
+    <p:sldId id="298" r:id="rId39"/>
+    <p:sldId id="284" r:id="rId40"/>
+    <p:sldId id="291" r:id="rId41"/>
+    <p:sldId id="292" r:id="rId42"/>
+    <p:sldId id="293" r:id="rId43"/>
+    <p:sldId id="295" r:id="rId44"/>
   </p:sldIdLst>
   <p:sldSz cx="9144000" cy="6858000" type="screen4x3"/>
   <p:notesSz cx="6858000" cy="9144000"/>
@@ -327,7 +331,7 @@
             <a:fld id="{1D8BD707-D9CF-40AE-B4C6-C98DA3205C09}" type="datetimeFigureOut">
               <a:rPr lang="en-US" smtClean="0"/>
               <a:pPr/>
-              <a:t>3/21/2017</a:t>
+              <a:t>7/11/2017</a:t>
             </a:fld>
             <a:endParaRPr lang="en-US" dirty="0"/>
           </a:p>
@@ -494,7 +498,7 @@
             <a:fld id="{1D8BD707-D9CF-40AE-B4C6-C98DA3205C09}" type="datetimeFigureOut">
               <a:rPr lang="en-US" smtClean="0"/>
               <a:pPr/>
-              <a:t>3/21/2017</a:t>
+              <a:t>7/11/2017</a:t>
             </a:fld>
             <a:endParaRPr lang="en-US" dirty="0"/>
           </a:p>
@@ -671,7 +675,7 @@
             <a:fld id="{1D8BD707-D9CF-40AE-B4C6-C98DA3205C09}" type="datetimeFigureOut">
               <a:rPr lang="en-US" smtClean="0"/>
               <a:pPr/>
-              <a:t>3/21/2017</a:t>
+              <a:t>7/11/2017</a:t>
             </a:fld>
             <a:endParaRPr lang="en-US" dirty="0"/>
           </a:p>
@@ -838,7 +842,7 @@
             <a:fld id="{1D8BD707-D9CF-40AE-B4C6-C98DA3205C09}" type="datetimeFigureOut">
               <a:rPr lang="en-US" smtClean="0"/>
               <a:pPr/>
-              <a:t>3/21/2017</a:t>
+              <a:t>7/11/2017</a:t>
             </a:fld>
             <a:endParaRPr lang="en-US" dirty="0"/>
           </a:p>
@@ -1081,7 +1085,7 @@
             <a:fld id="{1D8BD707-D9CF-40AE-B4C6-C98DA3205C09}" type="datetimeFigureOut">
               <a:rPr lang="en-US" smtClean="0"/>
               <a:pPr/>
-              <a:t>3/21/2017</a:t>
+              <a:t>7/11/2017</a:t>
             </a:fld>
             <a:endParaRPr lang="en-US" dirty="0"/>
           </a:p>
@@ -1366,7 +1370,7 @@
             <a:fld id="{1D8BD707-D9CF-40AE-B4C6-C98DA3205C09}" type="datetimeFigureOut">
               <a:rPr lang="en-US" smtClean="0"/>
               <a:pPr/>
-              <a:t>3/21/2017</a:t>
+              <a:t>7/11/2017</a:t>
             </a:fld>
             <a:endParaRPr lang="en-US" dirty="0"/>
           </a:p>
@@ -1785,7 +1789,7 @@
             <a:fld id="{1D8BD707-D9CF-40AE-B4C6-C98DA3205C09}" type="datetimeFigureOut">
               <a:rPr lang="en-US" smtClean="0"/>
               <a:pPr/>
-              <a:t>3/21/2017</a:t>
+              <a:t>7/11/2017</a:t>
             </a:fld>
             <a:endParaRPr lang="en-US" dirty="0"/>
           </a:p>
@@ -1900,7 +1904,7 @@
             <a:fld id="{1D8BD707-D9CF-40AE-B4C6-C98DA3205C09}" type="datetimeFigureOut">
               <a:rPr lang="en-US" smtClean="0"/>
               <a:pPr/>
-              <a:t>3/21/2017</a:t>
+              <a:t>7/11/2017</a:t>
             </a:fld>
             <a:endParaRPr lang="en-US" dirty="0"/>
           </a:p>
@@ -1992,7 +1996,7 @@
             <a:fld id="{1D8BD707-D9CF-40AE-B4C6-C98DA3205C09}" type="datetimeFigureOut">
               <a:rPr lang="en-US" smtClean="0"/>
               <a:pPr/>
-              <a:t>3/21/2017</a:t>
+              <a:t>7/11/2017</a:t>
             </a:fld>
             <a:endParaRPr lang="en-US" dirty="0"/>
           </a:p>
@@ -2266,7 +2270,7 @@
             <a:fld id="{1D8BD707-D9CF-40AE-B4C6-C98DA3205C09}" type="datetimeFigureOut">
               <a:rPr lang="en-US" smtClean="0"/>
               <a:pPr/>
-              <a:t>3/21/2017</a:t>
+              <a:t>7/11/2017</a:t>
             </a:fld>
             <a:endParaRPr lang="en-US" dirty="0"/>
           </a:p>
@@ -2516,7 +2520,7 @@
             <a:fld id="{1D8BD707-D9CF-40AE-B4C6-C98DA3205C09}" type="datetimeFigureOut">
               <a:rPr lang="en-US" smtClean="0"/>
               <a:pPr/>
-              <a:t>3/21/2017</a:t>
+              <a:t>7/11/2017</a:t>
             </a:fld>
             <a:endParaRPr lang="en-US" dirty="0"/>
           </a:p>
@@ -2735,7 +2739,7 @@
             <a:fld id="{1D8BD707-D9CF-40AE-B4C6-C98DA3205C09}" type="datetimeFigureOut">
               <a:rPr lang="en-US" smtClean="0"/>
               <a:pPr/>
-              <a:t>3/21/2017</a:t>
+              <a:t>7/11/2017</a:t>
             </a:fld>
             <a:endParaRPr lang="en-US" dirty="0"/>
           </a:p>
@@ -4224,15 +4228,7 @@
                   <a:schemeClr val="bg1"/>
                 </a:solidFill>
               </a:rPr>
-              <a:t>Astfel, </a:t>
-            </a:r>
-            <a:r>
-              <a:rPr lang="ro-RO" dirty="0" smtClean="0">
-                <a:solidFill>
-                  <a:schemeClr val="bg1"/>
-                </a:solidFill>
-              </a:rPr>
-              <a:t>jucătorul cumpăra arme, armuri, vrăji, poțiuni, skinuri, etc., obiecte care îl vor ajuta în lupte.</a:t>
+              <a:t>Astfel, jucătorul cumpăra arme, armuri, vrăji, poțiuni, skinuri, etc., obiecte care îl vor ajuta în lupte.</a:t>
             </a:r>
             <a:endParaRPr lang="ro-RO" dirty="0">
               <a:solidFill>
@@ -4922,7 +4918,23 @@
                   <a:schemeClr val="bg1"/>
                 </a:solidFill>
               </a:rPr>
-              <a:t>					-Peon din Warcraft III</a:t>
+              <a:t>					-Peon</a:t>
+            </a:r>
+            <a:r>
+              <a:rPr lang="en-US" dirty="0" smtClean="0">
+                <a:solidFill>
+                  <a:schemeClr val="bg1"/>
+                </a:solidFill>
+              </a:rPr>
+              <a:t>,</a:t>
+            </a:r>
+            <a:r>
+              <a:rPr lang="ro-RO" dirty="0" smtClean="0">
+                <a:solidFill>
+                  <a:schemeClr val="bg1"/>
+                </a:solidFill>
+              </a:rPr>
+              <a:t> Warcraft III</a:t>
             </a:r>
           </a:p>
         </p:txBody>
@@ -5011,15 +5023,7 @@
                   <a:schemeClr val="bg1"/>
                 </a:solidFill>
               </a:rPr>
-              <a:t>Unele personaje îi cer jucătorului să raspundă corect la o ghicitoare pentru a avansa în </a:t>
-            </a:r>
-            <a:r>
-              <a:rPr lang="ro-RO" dirty="0" smtClean="0">
-                <a:solidFill>
-                  <a:schemeClr val="bg1"/>
-                </a:solidFill>
-              </a:rPr>
-              <a:t>poveste, acest element conferind complexitate jocului și stimulând interacțiunea cu jucătorul.</a:t>
+              <a:t>Unele personaje îi cer jucătorului să raspundă corect la o ghicitoare pentru a avansa în poveste, acest element conferind complexitate jocului și stimulând interacțiunea cu jucătorul.</a:t>
             </a:r>
             <a:endParaRPr lang="ro-RO" dirty="0">
               <a:solidFill>
@@ -5411,23 +5415,7 @@
                   <a:schemeClr val="bg1"/>
                 </a:solidFill>
               </a:rPr>
-              <a:t>În luptă, jucătorul trebuie să reducă vitalitatea inamicului la </a:t>
-            </a:r>
-            <a:r>
-              <a:rPr lang="ro-RO" dirty="0" smtClean="0">
-                <a:solidFill>
-                  <a:schemeClr val="bg1"/>
-                </a:solidFill>
-              </a:rPr>
-              <a:t>zero </a:t>
-            </a:r>
-            <a:r>
-              <a:rPr lang="ro-RO" dirty="0" smtClean="0">
-                <a:solidFill>
-                  <a:schemeClr val="bg1"/>
-                </a:solidFill>
-              </a:rPr>
-              <a:t>folosindu-se de armă, de vrăji și de poțiuni. Pot fi construite build-uri adaptate special pentru un anumit tip de inamici, lucru care îi conferă complexitate acestui mod de joc.</a:t>
+              <a:t>În luptă, jucătorul trebuie să reducă vitalitatea inamicului la zero folosindu-se de armă, de vrăji și de poțiuni. Pot fi construite build-uri adaptate special pentru un anumit tip de inamici, lucru care îi conferă complexitate acestui mod de joc.</a:t>
             </a:r>
           </a:p>
         </p:txBody>
@@ -6083,23 +6071,7 @@
                   <a:schemeClr val="bg1"/>
                 </a:solidFill>
               </a:rPr>
-              <a:t>În acest mod, programul poate fi jucat de 2 jucători care se duelează între ei, pe același ecran și cu </a:t>
-            </a:r>
-            <a:r>
-              <a:rPr lang="ro-RO" dirty="0" smtClean="0">
-                <a:solidFill>
-                  <a:schemeClr val="bg1"/>
-                </a:solidFill>
-              </a:rPr>
-              <a:t>aceeași </a:t>
-            </a:r>
-            <a:r>
-              <a:rPr lang="ro-RO" dirty="0" smtClean="0">
-                <a:solidFill>
-                  <a:schemeClr val="bg1"/>
-                </a:solidFill>
-              </a:rPr>
-              <a:t>tastatură, prelungind astfel timpul petrecut în Pixel World. </a:t>
+              <a:t>În acest mod, programul poate fi jucat de 2 jucători care se duelează între ei, pe același ecran și cu aceeași tastatură, prelungind astfel timpul petrecut în Pixel World. </a:t>
             </a:r>
           </a:p>
           <a:p>
@@ -6510,47 +6482,18 @@
                   <a:schemeClr val="bg1"/>
                 </a:solidFill>
               </a:rPr>
-              <a:t> am implementat un sistem de chei</a:t>
-            </a:r>
+              <a:t> am implementat un sistem de chei, astfel când Timy completează o sarcină primește mai multe chei, dar îi sunt și luate anumite chei.</a:t>
+            </a:r>
+          </a:p>
+          <a:p>
             <a:r>
               <a:rPr lang="ro-RO" dirty="0" smtClean="0">
                 <a:solidFill>
                   <a:schemeClr val="bg1"/>
                 </a:solidFill>
               </a:rPr>
-              <a:t>, astfel </a:t>
-            </a:r>
-            <a:r>
-              <a:rPr lang="ro-RO" dirty="0" smtClean="0">
-                <a:solidFill>
-                  <a:schemeClr val="bg1"/>
-                </a:solidFill>
-              </a:rPr>
-              <a:t>când Timy completează o sarcină primește mai multe chei, dar îi sunt și luate anumite chei.</a:t>
-            </a:r>
-          </a:p>
-          <a:p>
-            <a:r>
-              <a:rPr lang="ro-RO" dirty="0" smtClean="0">
-                <a:solidFill>
-                  <a:schemeClr val="bg1"/>
-                </a:solidFill>
-              </a:rPr>
-              <a:t>Toate cheile primite sunt stocate și într-un container numit progres, </a:t>
-            </a:r>
-            <a:r>
-              <a:rPr lang="ro-RO" dirty="0" smtClean="0">
-                <a:solidFill>
-                  <a:schemeClr val="bg1"/>
-                </a:solidFill>
-              </a:rPr>
-              <a:t>care mă ajută să determin cât am avansat în poveste.</a:t>
-            </a:r>
-            <a:endParaRPr lang="ro-RO" dirty="0" smtClean="0">
-              <a:solidFill>
-                <a:schemeClr val="bg1"/>
-              </a:solidFill>
-            </a:endParaRPr>
+              <a:t>Toate cheile primite sunt stocate și într-un container numit progres, care mă ajută să determin cât am avansat în poveste.</a:t>
+            </a:r>
           </a:p>
           <a:p>
             <a:endParaRPr lang="ro-RO" dirty="0">
@@ -6614,7 +6557,23 @@
                   <a:schemeClr val="bg1"/>
                 </a:solidFill>
               </a:rPr>
-              <a:t>Desriere</a:t>
+              <a:t>Des</a:t>
+            </a:r>
+            <a:r>
+              <a:rPr lang="en-US" dirty="0" smtClean="0">
+                <a:solidFill>
+                  <a:schemeClr val="bg1"/>
+                </a:solidFill>
+              </a:rPr>
+              <a:t>c</a:t>
+            </a:r>
+            <a:r>
+              <a:rPr lang="ro-RO" dirty="0" smtClean="0">
+                <a:solidFill>
+                  <a:schemeClr val="bg1"/>
+                </a:solidFill>
+              </a:rPr>
+              <a:t>riere</a:t>
             </a:r>
             <a:endParaRPr lang="ro-RO" dirty="0">
               <a:solidFill>
@@ -6753,11 +6712,6 @@
               </a:rPr>
               <a:t>Jurnalul are rolul de a-i reaminti jucătorului cât de mult a avansat în poveste și ce ar trebui să facă în continuare.</a:t>
             </a:r>
-            <a:endParaRPr lang="ro-RO" dirty="0" smtClean="0">
-              <a:solidFill>
-                <a:schemeClr val="bg1"/>
-              </a:solidFill>
-            </a:endParaRPr>
           </a:p>
           <a:p>
             <a:r>
@@ -7135,11 +7089,6 @@
               </a:rPr>
               <a:t>Pentru a nu fi nevoie ca utilizatorul să se ducă la un magazin de fiecare dată când vrea să își schimbe build-ul, am adaugat inventarul. </a:t>
             </a:r>
-            <a:endParaRPr lang="ro-RO" dirty="0" smtClean="0">
-              <a:solidFill>
-                <a:schemeClr val="bg1"/>
-              </a:solidFill>
-            </a:endParaRPr>
           </a:p>
           <a:p>
             <a:r>
@@ -7148,15 +7097,7 @@
                   <a:schemeClr val="bg1"/>
                 </a:solidFill>
               </a:rPr>
-              <a:t>În acest </a:t>
-            </a:r>
-            <a:r>
-              <a:rPr lang="ro-RO" dirty="0" smtClean="0">
-                <a:solidFill>
-                  <a:schemeClr val="bg1"/>
-                </a:solidFill>
-              </a:rPr>
-              <a:t>ecran se pot echipa iteme și se pot schimba vrăji.</a:t>
+              <a:t>În acest ecran se pot echipa iteme și se pot schimba vrăji.</a:t>
             </a:r>
             <a:endParaRPr lang="ro-RO" dirty="0">
               <a:solidFill>
@@ -7859,12 +7800,36 @@
           <a:lstStyle/>
           <a:p>
             <a:r>
-              <a:rPr lang="ro-RO" dirty="0" smtClean="0">
-                <a:solidFill>
-                  <a:schemeClr val="bg1"/>
-                </a:solidFill>
-              </a:rPr>
-              <a:t>Pixel Retro Games</a:t>
+              <a:rPr lang="en-US" dirty="0" err="1" smtClean="0">
+                <a:solidFill>
+                  <a:schemeClr val="bg1"/>
+                </a:solidFill>
+              </a:rPr>
+              <a:t>Ce</a:t>
+            </a:r>
+            <a:r>
+              <a:rPr lang="en-US" dirty="0" smtClean="0">
+                <a:solidFill>
+                  <a:schemeClr val="bg1"/>
+                </a:solidFill>
+              </a:rPr>
+              <a:t> e </a:t>
+            </a:r>
+            <a:r>
+              <a:rPr lang="en-US" dirty="0" err="1" smtClean="0">
+                <a:solidFill>
+                  <a:schemeClr val="bg1"/>
+                </a:solidFill>
+              </a:rPr>
+              <a:t>nou</a:t>
+            </a:r>
+            <a:r>
+              <a:rPr lang="en-US" dirty="0" smtClean="0">
+                <a:solidFill>
+                  <a:schemeClr val="bg1"/>
+                </a:solidFill>
+              </a:rPr>
+              <a:t>?</a:t>
             </a:r>
             <a:endParaRPr lang="ro-RO" dirty="0">
               <a:solidFill>
@@ -7890,61 +7855,124 @@
           <a:lstStyle/>
           <a:p>
             <a:r>
-              <a:rPr lang="ro-RO" dirty="0" smtClean="0">
-                <a:solidFill>
-                  <a:schemeClr val="bg1"/>
-                </a:solidFill>
-              </a:rPr>
-              <a:t>În cadrul acestui proiect promovăm jocurile retro care nu consumă multe </a:t>
-            </a:r>
-            <a:r>
-              <a:rPr lang="ro-RO" dirty="0" smtClean="0">
-                <a:solidFill>
-                  <a:schemeClr val="bg1"/>
-                </a:solidFill>
-              </a:rPr>
-              <a:t>resurse, </a:t>
-            </a:r>
-            <a:r>
-              <a:rPr lang="ro-RO" dirty="0" smtClean="0">
-                <a:solidFill>
-                  <a:schemeClr val="bg1"/>
-                </a:solidFill>
-              </a:rPr>
-              <a:t>sunt distractive și </a:t>
-            </a:r>
-            <a:r>
-              <a:rPr lang="ro-RO" dirty="0" smtClean="0">
-                <a:solidFill>
-                  <a:schemeClr val="bg1"/>
-                </a:solidFill>
-              </a:rPr>
-              <a:t>dispun de un grad ridicat de calitatate. </a:t>
-            </a:r>
-            <a:r>
-              <a:rPr lang="ro-RO" dirty="0" smtClean="0">
-                <a:solidFill>
-                  <a:schemeClr val="bg1"/>
-                </a:solidFill>
-              </a:rPr>
-              <a:t>Pixel World este optimizat la extrem, pentru a minimiza cerințele de rulare. Cum jocurile de tip RPG sunt cele mai complexe și mai </a:t>
-            </a:r>
-            <a:r>
-              <a:rPr lang="ro-RO" dirty="0" smtClean="0">
-                <a:solidFill>
-                  <a:schemeClr val="bg1"/>
-                </a:solidFill>
-              </a:rPr>
-              <a:t>interesante</a:t>
-            </a:r>
-            <a:r>
-              <a:rPr lang="ro-RO" dirty="0" smtClean="0">
-                <a:solidFill>
-                  <a:schemeClr val="bg1"/>
-                </a:solidFill>
-              </a:rPr>
-              <a:t>, numele echipei conține aceste inițiale dar în alta ordine(PRG).</a:t>
-            </a:r>
+              <a:rPr lang="en-US" dirty="0" smtClean="0">
+                <a:solidFill>
+                  <a:schemeClr val="bg1"/>
+                </a:solidFill>
+              </a:rPr>
+              <a:t>Am </a:t>
+            </a:r>
+            <a:r>
+              <a:rPr lang="en-US" dirty="0" err="1" smtClean="0">
+                <a:solidFill>
+                  <a:schemeClr val="bg1"/>
+                </a:solidFill>
+              </a:rPr>
+              <a:t>trecut</a:t>
+            </a:r>
+            <a:r>
+              <a:rPr lang="en-US" dirty="0" smtClean="0">
+                <a:solidFill>
+                  <a:schemeClr val="bg1"/>
+                </a:solidFill>
+              </a:rPr>
+              <a:t> la SDL 2 (</a:t>
+            </a:r>
+            <a:r>
+              <a:rPr lang="en-US" dirty="0" err="1" smtClean="0">
+                <a:solidFill>
+                  <a:schemeClr val="bg1"/>
+                </a:solidFill>
+              </a:rPr>
+              <a:t>foloseste</a:t>
+            </a:r>
+            <a:r>
+              <a:rPr lang="en-US" dirty="0" smtClean="0">
+                <a:solidFill>
+                  <a:schemeClr val="bg1"/>
+                </a:solidFill>
+              </a:rPr>
+              <a:t> </a:t>
+            </a:r>
+            <a:r>
+              <a:rPr lang="en-US" dirty="0" err="1" smtClean="0">
+                <a:solidFill>
+                  <a:schemeClr val="bg1"/>
+                </a:solidFill>
+              </a:rPr>
+              <a:t>placa</a:t>
+            </a:r>
+            <a:r>
+              <a:rPr lang="en-US" dirty="0" smtClean="0">
+                <a:solidFill>
+                  <a:schemeClr val="bg1"/>
+                </a:solidFill>
+              </a:rPr>
+              <a:t> video).</a:t>
+            </a:r>
+          </a:p>
+          <a:p>
+            <a:r>
+              <a:rPr lang="en-US" dirty="0" smtClean="0">
+                <a:solidFill>
+                  <a:schemeClr val="bg1"/>
+                </a:solidFill>
+              </a:rPr>
+              <a:t>Am </a:t>
+            </a:r>
+            <a:r>
+              <a:rPr lang="en-US" dirty="0" err="1" smtClean="0">
+                <a:solidFill>
+                  <a:schemeClr val="bg1"/>
+                </a:solidFill>
+              </a:rPr>
+              <a:t>adaugat</a:t>
+            </a:r>
+            <a:r>
+              <a:rPr lang="en-US" dirty="0" smtClean="0">
+                <a:solidFill>
+                  <a:schemeClr val="bg1"/>
+                </a:solidFill>
+              </a:rPr>
+              <a:t> </a:t>
+            </a:r>
+            <a:r>
+              <a:rPr lang="en-US" dirty="0" err="1" smtClean="0">
+                <a:solidFill>
+                  <a:schemeClr val="bg1"/>
+                </a:solidFill>
+              </a:rPr>
+              <a:t>suport</a:t>
+            </a:r>
+            <a:r>
+              <a:rPr lang="en-US" dirty="0" smtClean="0">
+                <a:solidFill>
+                  <a:schemeClr val="bg1"/>
+                </a:solidFill>
+              </a:rPr>
+              <a:t> </a:t>
+            </a:r>
+            <a:r>
+              <a:rPr lang="en-US" dirty="0" err="1" smtClean="0">
+                <a:solidFill>
+                  <a:schemeClr val="bg1"/>
+                </a:solidFill>
+              </a:rPr>
+              <a:t>pentru</a:t>
+            </a:r>
+            <a:r>
+              <a:rPr lang="en-US" dirty="0" smtClean="0">
+                <a:solidFill>
+                  <a:schemeClr val="bg1"/>
+                </a:solidFill>
+              </a:rPr>
+              <a:t> controller.</a:t>
+            </a:r>
+            <a:endParaRPr lang="en-US" smtClean="0">
+              <a:solidFill>
+                <a:schemeClr val="bg1"/>
+              </a:solidFill>
+            </a:endParaRPr>
           </a:p>
           <a:p>
             <a:endParaRPr lang="ro-RO" dirty="0">
@@ -7960,13 +7988,6 @@
   <p:clrMapOvr>
     <a:masterClrMapping/>
   </p:clrMapOvr>
-  <p:timing>
-    <p:tnLst>
-      <p:par>
-        <p:cTn id="1" dur="indefinite" restart="never" nodeType="tmRoot"/>
-      </p:par>
-    </p:tnLst>
-  </p:timing>
 </p:sld>
 </file>
 
@@ -8003,12 +8024,36 @@
           <a:lstStyle/>
           <a:p>
             <a:r>
-              <a:rPr lang="ro-RO" dirty="0" smtClean="0">
-                <a:solidFill>
-                  <a:schemeClr val="bg1"/>
-                </a:solidFill>
-              </a:rPr>
-              <a:t>De ce nu Unity?</a:t>
+              <a:rPr lang="en-US" dirty="0" err="1" smtClean="0">
+                <a:solidFill>
+                  <a:schemeClr val="bg1"/>
+                </a:solidFill>
+              </a:rPr>
+              <a:t>Suport</a:t>
+            </a:r>
+            <a:r>
+              <a:rPr lang="en-US" dirty="0" smtClean="0">
+                <a:solidFill>
+                  <a:schemeClr val="bg1"/>
+                </a:solidFill>
+              </a:rPr>
+              <a:t> </a:t>
+            </a:r>
+            <a:r>
+              <a:rPr lang="en-US" dirty="0" err="1" smtClean="0">
+                <a:solidFill>
+                  <a:schemeClr val="bg1"/>
+                </a:solidFill>
+              </a:rPr>
+              <a:t>pentru</a:t>
+            </a:r>
+            <a:r>
+              <a:rPr lang="en-US" dirty="0" smtClean="0">
+                <a:solidFill>
+                  <a:schemeClr val="bg1"/>
+                </a:solidFill>
+              </a:rPr>
+              <a:t> controller</a:t>
             </a:r>
             <a:endParaRPr lang="ro-RO" dirty="0">
               <a:solidFill>
@@ -8030,26 +8075,106 @@
         </p:nvSpPr>
         <p:spPr/>
         <p:txBody>
-          <a:bodyPr>
-            <a:normAutofit lnSpcReduction="10000"/>
-          </a:bodyPr>
-          <a:lstStyle/>
-          <a:p>
+          <a:bodyPr/>
+          <a:lstStyle/>
+          <a:p>
+            <a:r>
+              <a:rPr lang="en-US" dirty="0" err="1" smtClean="0">
+                <a:solidFill>
+                  <a:schemeClr val="bg1"/>
+                </a:solidFill>
+              </a:rPr>
+              <a:t>Pentru</a:t>
+            </a:r>
+            <a:r>
+              <a:rPr lang="en-US" dirty="0" smtClean="0">
+                <a:solidFill>
+                  <a:schemeClr val="bg1"/>
+                </a:solidFill>
+              </a:rPr>
+              <a:t> Duel Mode, un controller era un element </a:t>
+            </a:r>
+            <a:r>
+              <a:rPr lang="en-US" dirty="0" err="1" smtClean="0">
+                <a:solidFill>
+                  <a:schemeClr val="bg1"/>
+                </a:solidFill>
+              </a:rPr>
+              <a:t>necesar</a:t>
+            </a:r>
+            <a:r>
+              <a:rPr lang="en-US" dirty="0" smtClean="0">
+                <a:solidFill>
+                  <a:schemeClr val="bg1"/>
+                </a:solidFill>
+              </a:rPr>
+              <a:t> </a:t>
+            </a:r>
+            <a:r>
+              <a:rPr lang="en-US" dirty="0" err="1" smtClean="0">
+                <a:solidFill>
+                  <a:schemeClr val="bg1"/>
+                </a:solidFill>
+              </a:rPr>
+              <a:t>pentru</a:t>
+            </a:r>
+            <a:r>
+              <a:rPr lang="en-US" dirty="0" smtClean="0">
+                <a:solidFill>
+                  <a:schemeClr val="bg1"/>
+                </a:solidFill>
+              </a:rPr>
+              <a:t> a </a:t>
+            </a:r>
+            <a:r>
+              <a:rPr lang="en-US" dirty="0" err="1" smtClean="0">
+                <a:solidFill>
+                  <a:schemeClr val="bg1"/>
+                </a:solidFill>
+              </a:rPr>
+              <a:t>imbunatati</a:t>
+            </a:r>
+            <a:r>
+              <a:rPr lang="en-US" dirty="0" smtClean="0">
+                <a:solidFill>
+                  <a:schemeClr val="bg1"/>
+                </a:solidFill>
+              </a:rPr>
+              <a:t> </a:t>
+            </a:r>
+            <a:r>
+              <a:rPr lang="en-US" dirty="0" err="1" smtClean="0">
+                <a:solidFill>
+                  <a:schemeClr val="bg1"/>
+                </a:solidFill>
+              </a:rPr>
+              <a:t>experienta</a:t>
+            </a:r>
+            <a:r>
+              <a:rPr lang="en-US" dirty="0" smtClean="0">
+                <a:solidFill>
+                  <a:schemeClr val="bg1"/>
+                </a:solidFill>
+              </a:rPr>
+              <a:t> multiplayer</a:t>
+            </a:r>
             <a:r>
               <a:rPr lang="ro-RO" dirty="0" smtClean="0">
                 <a:solidFill>
                   <a:schemeClr val="bg1"/>
                 </a:solidFill>
               </a:rPr>
-              <a:t>Pentru a dezvolta acest joc am folosit C++ și SDL1.2. De ce? Pentru ca un joc 2D nu are nevoie de un engine prefabricat ci poate fi scris odată cu jocul. Pentru că C++ este rapid și oferă programare orientată obiect. Pentru că această combinație de tehnologii este ușor de portat și întreținut, iar scrierea aplicației este înca interesantă, fiind nevoit să scriu cod, nu să folosesc tehnici Drag and Drop ca </a:t>
-            </a:r>
+              <a:t>.</a:t>
+            </a:r>
+          </a:p>
+          <a:p>
             <a:r>
               <a:rPr lang="ro-RO" dirty="0" smtClean="0">
                 <a:solidFill>
                   <a:schemeClr val="bg1"/>
                 </a:solidFill>
               </a:rPr>
-              <a:t>în alte engine-uri.</a:t>
+              <a:t>Și Story Mode suporta controllerul.</a:t>
             </a:r>
             <a:endParaRPr lang="ro-RO" dirty="0">
               <a:solidFill>
@@ -8064,6 +8189,13 @@
   <p:clrMapOvr>
     <a:masterClrMapping/>
   </p:clrMapOvr>
+  <p:timing>
+    <p:tnLst>
+      <p:par>
+        <p:cTn id="1" dur="indefinite" restart="never" nodeType="tmRoot"/>
+      </p:par>
+    </p:tnLst>
+  </p:timing>
 </p:sld>
 </file>
 
@@ -8084,205 +8216,51 @@
           <a:chExt cx="0" cy="0"/>
         </a:xfrm>
       </p:grpSpPr>
-      <p:sp>
-        <p:nvSpPr>
-          <p:cNvPr id="2" name="Title 1"/>
-          <p:cNvSpPr>
-            <a:spLocks noGrp="1"/>
-          </p:cNvSpPr>
-          <p:nvPr>
-            <p:ph type="title"/>
-          </p:nvPr>
-        </p:nvSpPr>
-        <p:spPr/>
-        <p:txBody>
-          <a:bodyPr/>
-          <a:lstStyle/>
-          <a:p>
-            <a:r>
-              <a:rPr lang="ro-RO" dirty="0" smtClean="0">
-                <a:solidFill>
-                  <a:schemeClr val="bg1"/>
-                </a:solidFill>
-              </a:rPr>
-              <a:t>De ce?</a:t>
-            </a:r>
-            <a:endParaRPr lang="ro-RO" dirty="0">
-              <a:solidFill>
-                <a:schemeClr val="bg1"/>
-              </a:solidFill>
-            </a:endParaRPr>
-          </a:p>
-        </p:txBody>
-      </p:sp>
-      <p:sp>
-        <p:nvSpPr>
-          <p:cNvPr id="3" name="Content Placeholder 2"/>
-          <p:cNvSpPr>
-            <a:spLocks noGrp="1"/>
-          </p:cNvSpPr>
-          <p:nvPr>
-            <p:ph idx="1"/>
-          </p:nvPr>
-        </p:nvSpPr>
-        <p:spPr/>
-        <p:txBody>
-          <a:bodyPr>
-            <a:normAutofit fontScale="85000" lnSpcReduction="10000"/>
-          </a:bodyPr>
-          <a:lstStyle/>
-          <a:p>
-            <a:r>
-              <a:rPr lang="ro-RO" dirty="0" smtClean="0">
-                <a:solidFill>
-                  <a:schemeClr val="bg1"/>
-                </a:solidFill>
-              </a:rPr>
-              <a:t>Acest joc este creat pentru </a:t>
-            </a:r>
-            <a:r>
-              <a:rPr lang="ro-RO" dirty="0" smtClean="0">
-                <a:solidFill>
-                  <a:schemeClr val="bg1"/>
-                </a:solidFill>
-              </a:rPr>
-              <a:t>persoanele </a:t>
-            </a:r>
-            <a:r>
-              <a:rPr lang="ro-RO" dirty="0" smtClean="0">
-                <a:solidFill>
-                  <a:schemeClr val="bg1"/>
-                </a:solidFill>
-              </a:rPr>
-              <a:t>care apreciază jocurile retro și sunt </a:t>
-            </a:r>
-            <a:r>
-              <a:rPr lang="ro-RO" dirty="0" smtClean="0">
-                <a:solidFill>
-                  <a:schemeClr val="bg1"/>
-                </a:solidFill>
-              </a:rPr>
-              <a:t>dornice </a:t>
-            </a:r>
-            <a:r>
-              <a:rPr lang="ro-RO" dirty="0" smtClean="0">
-                <a:solidFill>
-                  <a:schemeClr val="bg1"/>
-                </a:solidFill>
-              </a:rPr>
-              <a:t>să exploreze o lume virtuala plină de </a:t>
-            </a:r>
-            <a:r>
-              <a:rPr lang="ro-RO" dirty="0" smtClean="0">
-                <a:solidFill>
-                  <a:schemeClr val="bg1"/>
-                </a:solidFill>
-              </a:rPr>
-              <a:t>provocări. </a:t>
-            </a:r>
-            <a:r>
-              <a:rPr lang="ro-RO" dirty="0" smtClean="0">
-                <a:solidFill>
-                  <a:schemeClr val="bg1"/>
-                </a:solidFill>
-              </a:rPr>
-              <a:t>C</a:t>
-            </a:r>
-            <a:r>
-              <a:rPr lang="ro-RO" dirty="0" smtClean="0">
-                <a:solidFill>
-                  <a:schemeClr val="bg1"/>
-                </a:solidFill>
-              </a:rPr>
-              <a:t>erințele </a:t>
-            </a:r>
-            <a:r>
-              <a:rPr lang="ro-RO" dirty="0" smtClean="0">
-                <a:solidFill>
-                  <a:schemeClr val="bg1"/>
-                </a:solidFill>
-              </a:rPr>
-              <a:t>de rulare sunt minime, așa că poate fi portat pe sisteme mobile (Android, IOS, Nintendo Switch, etc.).</a:t>
-            </a:r>
-          </a:p>
-          <a:p>
-            <a:r>
-              <a:rPr lang="ro-RO" dirty="0" smtClean="0">
-                <a:solidFill>
-                  <a:schemeClr val="bg1"/>
-                </a:solidFill>
-              </a:rPr>
-              <a:t>Convingerea </a:t>
-            </a:r>
-            <a:r>
-              <a:rPr lang="ro-RO" dirty="0" smtClean="0">
-                <a:solidFill>
-                  <a:schemeClr val="bg1"/>
-                </a:solidFill>
-              </a:rPr>
-              <a:t>mea este că acest joc și-a atins scopul: poate spune o poveste </a:t>
-            </a:r>
-            <a:r>
-              <a:rPr lang="ro-RO" dirty="0" smtClean="0">
-                <a:solidFill>
-                  <a:schemeClr val="bg1"/>
-                </a:solidFill>
-              </a:rPr>
-              <a:t>complexă </a:t>
-            </a:r>
-            <a:r>
-              <a:rPr lang="ro-RO" dirty="0" smtClean="0">
-                <a:solidFill>
-                  <a:schemeClr val="bg1"/>
-                </a:solidFill>
-              </a:rPr>
-              <a:t>fară a deveni repetitiv, prezentând elemente </a:t>
-            </a:r>
-            <a:r>
-              <a:rPr lang="ro-RO" dirty="0" smtClean="0">
-                <a:solidFill>
-                  <a:schemeClr val="bg1"/>
-                </a:solidFill>
-              </a:rPr>
-              <a:t>diverse (</a:t>
-            </a:r>
-            <a:r>
-              <a:rPr lang="ro-RO" dirty="0" smtClean="0">
-                <a:solidFill>
-                  <a:schemeClr val="bg1"/>
-                </a:solidFill>
-              </a:rPr>
-              <a:t>lupte, puzzle-uri,dialoguri,etc</a:t>
-            </a:r>
-            <a:r>
-              <a:rPr lang="ro-RO" dirty="0" smtClean="0">
-                <a:solidFill>
-                  <a:schemeClr val="bg1"/>
-                </a:solidFill>
-              </a:rPr>
-              <a:t>.). </a:t>
-            </a:r>
-            <a:r>
-              <a:rPr lang="ro-RO" dirty="0" smtClean="0">
-                <a:solidFill>
-                  <a:schemeClr val="bg1"/>
-                </a:solidFill>
-              </a:rPr>
-              <a:t>Elementele vizuale și auditive sunt calitative și oferă o experiența unica jucătorului.</a:t>
-            </a:r>
-            <a:endParaRPr lang="ro-RO" dirty="0">
-              <a:solidFill>
-                <a:schemeClr val="bg1"/>
-              </a:solidFill>
-            </a:endParaRPr>
-          </a:p>
-        </p:txBody>
-      </p:sp>
+      <p:pic>
+        <p:nvPicPr>
+          <p:cNvPr id="1029" name="Picture 5"/>
+          <p:cNvPicPr>
+            <a:picLocks noChangeAspect="1" noChangeArrowheads="1"/>
+          </p:cNvPicPr>
+          <p:nvPr/>
+        </p:nvPicPr>
+        <p:blipFill>
+          <a:blip r:embed="rId2"/>
+          <a:srcRect/>
+          <a:stretch>
+            <a:fillRect/>
+          </a:stretch>
+        </p:blipFill>
+        <p:spPr bwMode="auto">
+          <a:xfrm>
+            <a:off x="-685800" y="455073"/>
+            <a:ext cx="10574338" cy="5945727"/>
+          </a:xfrm>
+          <a:prstGeom prst="rect">
+            <a:avLst/>
+          </a:prstGeom>
+          <a:noFill/>
+          <a:ln w="9525">
+            <a:noFill/>
+            <a:miter lim="800000"/>
+            <a:headEnd/>
+            <a:tailEnd/>
+          </a:ln>
+          <a:effectLst/>
+        </p:spPr>
+      </p:pic>
     </p:spTree>
   </p:cSld>
   <p:clrMapOvr>
     <a:masterClrMapping/>
   </p:clrMapOvr>
+  <p:timing>
+    <p:tnLst>
+      <p:par>
+        <p:cTn id="1" dur="indefinite" restart="never" nodeType="tmRoot"/>
+      </p:par>
+    </p:tnLst>
+  </p:timing>
 </p:sld>
 </file>
 
@@ -8319,12 +8297,20 @@
           <a:lstStyle/>
           <a:p>
             <a:r>
-              <a:rPr lang="ro-RO" dirty="0" smtClean="0">
-                <a:solidFill>
-                  <a:schemeClr val="bg1"/>
-                </a:solidFill>
-              </a:rPr>
-              <a:t>Ghid de instalare</a:t>
+              <a:rPr lang="en-US" dirty="0" err="1" smtClean="0">
+                <a:solidFill>
+                  <a:schemeClr val="bg1"/>
+                </a:solidFill>
+              </a:rPr>
+              <a:t>Accelerare</a:t>
+            </a:r>
+            <a:r>
+              <a:rPr lang="en-US" dirty="0" smtClean="0">
+                <a:solidFill>
+                  <a:schemeClr val="bg1"/>
+                </a:solidFill>
+              </a:rPr>
+              <a:t> Hardware</a:t>
             </a:r>
             <a:endParaRPr lang="ro-RO" dirty="0">
               <a:solidFill>
@@ -8347,95 +8333,647 @@
         <p:spPr/>
         <p:txBody>
           <a:bodyPr>
-            <a:normAutofit fontScale="85000" lnSpcReduction="20000"/>
+            <a:normAutofit fontScale="92500" lnSpcReduction="10000"/>
           </a:bodyPr>
           <a:lstStyle/>
           <a:p>
             <a:r>
-              <a:rPr lang="ro-RO" dirty="0" smtClean="0">
-                <a:solidFill>
-                  <a:schemeClr val="bg1"/>
-                </a:solidFill>
-              </a:rPr>
-              <a:t>Această versiune de joc a fost testată doar pe Windows 10. Se recomandă cel puțin 500 mb de RAM și un procesor de cel puțin 1,5-2 Ghz.</a:t>
-            </a:r>
-          </a:p>
-          <a:p>
-            <a:r>
-              <a:rPr lang="ro-RO" dirty="0" smtClean="0">
-                <a:solidFill>
-                  <a:schemeClr val="bg1"/>
-                </a:solidFill>
-              </a:rPr>
-              <a:t>Instalarea este foarte ușoara. Tot ce trebuie făcut este să fie dezarhivat proiectul în orice locație, iar pentru a porni jocul se va folosi Launcher.exe din </a:t>
-            </a:r>
-            <a:r>
-              <a:rPr lang="ro-RO" dirty="0" smtClean="0">
-                <a:solidFill>
-                  <a:schemeClr val="bg1"/>
-                </a:solidFill>
-              </a:rPr>
-              <a:t>folder-ul </a:t>
-            </a:r>
-            <a:r>
-              <a:rPr lang="ro-RO" dirty="0" smtClean="0">
-                <a:solidFill>
-                  <a:schemeClr val="bg1"/>
-                </a:solidFill>
-              </a:rPr>
-              <a:t>principal.</a:t>
-            </a:r>
-          </a:p>
-          <a:p>
-            <a:r>
-              <a:rPr lang="ro-RO" dirty="0" smtClean="0">
-                <a:solidFill>
-                  <a:schemeClr val="bg1"/>
-                </a:solidFill>
-              </a:rPr>
-              <a:t>În cazul în care setările au fost </a:t>
-            </a:r>
-            <a:r>
-              <a:rPr lang="ro-RO" dirty="0" smtClean="0">
-                <a:solidFill>
-                  <a:schemeClr val="bg1"/>
-                </a:solidFill>
-              </a:rPr>
-              <a:t>modificate, </a:t>
-            </a:r>
-            <a:r>
-              <a:rPr lang="ro-RO" dirty="0" smtClean="0">
-                <a:solidFill>
-                  <a:schemeClr val="bg1"/>
-                </a:solidFill>
-              </a:rPr>
-              <a:t>iar acum programul nu mai pornește, lansați reset-settings.bat.</a:t>
-            </a:r>
-          </a:p>
-          <a:p>
-            <a:r>
-              <a:rPr lang="ro-RO" dirty="0" smtClean="0">
-                <a:solidFill>
-                  <a:schemeClr val="bg1"/>
-                </a:solidFill>
-              </a:rPr>
-              <a:t>Pentru a reseta </a:t>
-            </a:r>
-            <a:r>
-              <a:rPr lang="ro-RO" dirty="0" smtClean="0">
-                <a:solidFill>
-                  <a:schemeClr val="bg1"/>
-                </a:solidFill>
-              </a:rPr>
-              <a:t>salvările </a:t>
-            </a:r>
-            <a:r>
-              <a:rPr lang="ro-RO" dirty="0" smtClean="0">
-                <a:solidFill>
-                  <a:schemeClr val="bg1"/>
-                </a:solidFill>
-              </a:rPr>
-              <a:t>folosiți reset-saves.bat, iar pentru a schimba salvarea curentă cu una cu bani mai mulți, folosiți money.bat.</a:t>
+              <a:rPr lang="en-US" dirty="0" err="1" smtClean="0">
+                <a:solidFill>
+                  <a:schemeClr val="bg1"/>
+                </a:solidFill>
+              </a:rPr>
+              <a:t>Utilizarea</a:t>
+            </a:r>
+            <a:r>
+              <a:rPr lang="en-US" dirty="0" smtClean="0">
+                <a:solidFill>
+                  <a:schemeClr val="bg1"/>
+                </a:solidFill>
+              </a:rPr>
+              <a:t> GPU a </a:t>
+            </a:r>
+            <a:r>
+              <a:rPr lang="en-US" dirty="0" err="1" smtClean="0">
+                <a:solidFill>
+                  <a:schemeClr val="bg1"/>
+                </a:solidFill>
+              </a:rPr>
+              <a:t>fost</a:t>
+            </a:r>
+            <a:r>
+              <a:rPr lang="en-US" dirty="0" smtClean="0">
+                <a:solidFill>
+                  <a:schemeClr val="bg1"/>
+                </a:solidFill>
+              </a:rPr>
+              <a:t> un element </a:t>
+            </a:r>
+            <a:r>
+              <a:rPr lang="en-US" dirty="0" err="1" smtClean="0">
+                <a:solidFill>
+                  <a:schemeClr val="bg1"/>
+                </a:solidFill>
+              </a:rPr>
+              <a:t>pe</a:t>
+            </a:r>
+            <a:r>
+              <a:rPr lang="en-US" dirty="0" smtClean="0">
+                <a:solidFill>
+                  <a:schemeClr val="bg1"/>
+                </a:solidFill>
+              </a:rPr>
+              <a:t> care am </a:t>
+            </a:r>
+            <a:r>
+              <a:rPr lang="en-US" dirty="0" err="1" smtClean="0">
+                <a:solidFill>
+                  <a:schemeClr val="bg1"/>
+                </a:solidFill>
+              </a:rPr>
+              <a:t>vrut</a:t>
+            </a:r>
+            <a:r>
+              <a:rPr lang="en-US" dirty="0" smtClean="0">
+                <a:solidFill>
+                  <a:schemeClr val="bg1"/>
+                </a:solidFill>
+              </a:rPr>
+              <a:t> </a:t>
+            </a:r>
+            <a:r>
+              <a:rPr lang="en-US" dirty="0" err="1" smtClean="0">
+                <a:solidFill>
+                  <a:schemeClr val="bg1"/>
+                </a:solidFill>
+              </a:rPr>
+              <a:t>sa</a:t>
+            </a:r>
+            <a:r>
+              <a:rPr lang="en-US" dirty="0" smtClean="0">
+                <a:solidFill>
+                  <a:schemeClr val="bg1"/>
+                </a:solidFill>
+              </a:rPr>
+              <a:t>-l </a:t>
+            </a:r>
+            <a:r>
+              <a:rPr lang="en-US" dirty="0" err="1" smtClean="0">
+                <a:solidFill>
+                  <a:schemeClr val="bg1"/>
+                </a:solidFill>
+              </a:rPr>
+              <a:t>introducem</a:t>
+            </a:r>
+            <a:r>
+              <a:rPr lang="en-US" dirty="0" smtClean="0">
+                <a:solidFill>
+                  <a:schemeClr val="bg1"/>
+                </a:solidFill>
+              </a:rPr>
+              <a:t> cat </a:t>
+            </a:r>
+            <a:r>
+              <a:rPr lang="en-US" dirty="0" err="1" smtClean="0">
+                <a:solidFill>
+                  <a:schemeClr val="bg1"/>
+                </a:solidFill>
+              </a:rPr>
+              <a:t>mai</a:t>
+            </a:r>
+            <a:r>
+              <a:rPr lang="en-US" dirty="0" smtClean="0">
+                <a:solidFill>
+                  <a:schemeClr val="bg1"/>
+                </a:solidFill>
+              </a:rPr>
+              <a:t> rapid.</a:t>
+            </a:r>
+          </a:p>
+          <a:p>
+            <a:r>
+              <a:rPr lang="en-US" dirty="0" smtClean="0">
+                <a:solidFill>
+                  <a:schemeClr val="bg1"/>
+                </a:solidFill>
+              </a:rPr>
+              <a:t>Am </a:t>
+            </a:r>
+            <a:r>
+              <a:rPr lang="en-US" dirty="0" err="1" smtClean="0">
+                <a:solidFill>
+                  <a:schemeClr val="bg1"/>
+                </a:solidFill>
+              </a:rPr>
+              <a:t>folosit</a:t>
+            </a:r>
+            <a:r>
+              <a:rPr lang="en-US" dirty="0" smtClean="0">
+                <a:solidFill>
+                  <a:schemeClr val="bg1"/>
+                </a:solidFill>
+              </a:rPr>
+              <a:t> SDL 1.2 cu OpenGL, </a:t>
+            </a:r>
+            <a:r>
+              <a:rPr lang="en-US" dirty="0" err="1" smtClean="0">
+                <a:solidFill>
+                  <a:schemeClr val="bg1"/>
+                </a:solidFill>
+              </a:rPr>
+              <a:t>iar</a:t>
+            </a:r>
+            <a:r>
+              <a:rPr lang="en-US" dirty="0" smtClean="0">
+                <a:solidFill>
+                  <a:schemeClr val="bg1"/>
+                </a:solidFill>
+              </a:rPr>
+              <a:t> </a:t>
+            </a:r>
+            <a:r>
+              <a:rPr lang="en-US" dirty="0" err="1" smtClean="0">
+                <a:solidFill>
+                  <a:schemeClr val="bg1"/>
+                </a:solidFill>
+              </a:rPr>
+              <a:t>apoi</a:t>
+            </a:r>
+            <a:r>
+              <a:rPr lang="en-US" dirty="0" smtClean="0">
+                <a:solidFill>
+                  <a:schemeClr val="bg1"/>
+                </a:solidFill>
+              </a:rPr>
+              <a:t> am </a:t>
+            </a:r>
+            <a:r>
+              <a:rPr lang="en-US" dirty="0" err="1" smtClean="0">
+                <a:solidFill>
+                  <a:schemeClr val="bg1"/>
+                </a:solidFill>
+              </a:rPr>
+              <a:t>trecut</a:t>
+            </a:r>
+            <a:r>
+              <a:rPr lang="en-US" dirty="0" smtClean="0">
+                <a:solidFill>
+                  <a:schemeClr val="bg1"/>
+                </a:solidFill>
+              </a:rPr>
+              <a:t> la SDL 2.</a:t>
+            </a:r>
+          </a:p>
+          <a:p>
+            <a:r>
+              <a:rPr lang="en-US" dirty="0" err="1" smtClean="0">
+                <a:solidFill>
+                  <a:schemeClr val="bg1"/>
+                </a:solidFill>
+              </a:rPr>
+              <a:t>Performantele</a:t>
+            </a:r>
+            <a:r>
+              <a:rPr lang="en-US" dirty="0" smtClean="0">
+                <a:solidFill>
+                  <a:schemeClr val="bg1"/>
+                </a:solidFill>
+              </a:rPr>
+              <a:t> au </a:t>
+            </a:r>
+            <a:r>
+              <a:rPr lang="en-US" dirty="0" err="1" smtClean="0">
+                <a:solidFill>
+                  <a:schemeClr val="bg1"/>
+                </a:solidFill>
+              </a:rPr>
+              <a:t>crescut</a:t>
+            </a:r>
+            <a:r>
+              <a:rPr lang="en-US" dirty="0" smtClean="0">
+                <a:solidFill>
+                  <a:schemeClr val="bg1"/>
+                </a:solidFill>
+              </a:rPr>
+              <a:t> </a:t>
+            </a:r>
+            <a:r>
+              <a:rPr lang="en-US" dirty="0" err="1" smtClean="0">
+                <a:solidFill>
+                  <a:schemeClr val="bg1"/>
+                </a:solidFill>
+              </a:rPr>
+              <a:t>considerabil</a:t>
+            </a:r>
+            <a:r>
+              <a:rPr lang="en-US" dirty="0" smtClean="0">
+                <a:solidFill>
+                  <a:schemeClr val="bg1"/>
+                </a:solidFill>
+              </a:rPr>
+              <a:t>, </a:t>
+            </a:r>
+            <a:r>
+              <a:rPr lang="en-US" dirty="0" err="1" smtClean="0">
+                <a:solidFill>
+                  <a:schemeClr val="bg1"/>
+                </a:solidFill>
+              </a:rPr>
+              <a:t>iar</a:t>
+            </a:r>
+            <a:r>
+              <a:rPr lang="en-US" dirty="0" smtClean="0">
+                <a:solidFill>
+                  <a:schemeClr val="bg1"/>
+                </a:solidFill>
+              </a:rPr>
+              <a:t> </a:t>
+            </a:r>
+            <a:r>
+              <a:rPr lang="en-US" dirty="0" err="1" smtClean="0">
+                <a:solidFill>
+                  <a:schemeClr val="bg1"/>
+                </a:solidFill>
+              </a:rPr>
+              <a:t>pentru</a:t>
+            </a:r>
+            <a:r>
+              <a:rPr lang="en-US" dirty="0" smtClean="0">
+                <a:solidFill>
+                  <a:schemeClr val="bg1"/>
+                </a:solidFill>
+              </a:rPr>
+              <a:t> ca a </a:t>
+            </a:r>
+            <a:r>
+              <a:rPr lang="en-US" dirty="0" err="1" smtClean="0">
+                <a:solidFill>
+                  <a:schemeClr val="bg1"/>
+                </a:solidFill>
+              </a:rPr>
+              <a:t>fost</a:t>
+            </a:r>
+            <a:r>
+              <a:rPr lang="en-US" dirty="0" smtClean="0">
+                <a:solidFill>
+                  <a:schemeClr val="bg1"/>
+                </a:solidFill>
+              </a:rPr>
+              <a:t> </a:t>
+            </a:r>
+            <a:r>
+              <a:rPr lang="en-US" dirty="0" err="1" smtClean="0">
+                <a:solidFill>
+                  <a:schemeClr val="bg1"/>
+                </a:solidFill>
+              </a:rPr>
+              <a:t>facut</a:t>
+            </a:r>
+            <a:r>
+              <a:rPr lang="en-US" dirty="0" smtClean="0">
+                <a:solidFill>
+                  <a:schemeClr val="bg1"/>
+                </a:solidFill>
+              </a:rPr>
+              <a:t> </a:t>
+            </a:r>
+            <a:r>
+              <a:rPr lang="en-US" dirty="0" err="1" smtClean="0">
+                <a:solidFill>
+                  <a:schemeClr val="bg1"/>
+                </a:solidFill>
+              </a:rPr>
+              <a:t>mai</a:t>
+            </a:r>
+            <a:r>
+              <a:rPr lang="en-US" dirty="0" smtClean="0">
+                <a:solidFill>
+                  <a:schemeClr val="bg1"/>
+                </a:solidFill>
+              </a:rPr>
+              <a:t> </a:t>
+            </a:r>
+            <a:r>
+              <a:rPr lang="en-US" dirty="0" err="1" smtClean="0">
+                <a:solidFill>
+                  <a:schemeClr val="bg1"/>
+                </a:solidFill>
+              </a:rPr>
+              <a:t>intai</a:t>
+            </a:r>
+            <a:r>
+              <a:rPr lang="en-US" dirty="0" smtClean="0">
+                <a:solidFill>
+                  <a:schemeClr val="bg1"/>
+                </a:solidFill>
+              </a:rPr>
+              <a:t> </a:t>
+            </a:r>
+            <a:r>
+              <a:rPr lang="en-US" dirty="0" err="1" smtClean="0">
+                <a:solidFill>
+                  <a:schemeClr val="bg1"/>
+                </a:solidFill>
+              </a:rPr>
+              <a:t>sa</a:t>
+            </a:r>
+            <a:r>
+              <a:rPr lang="en-US" dirty="0" smtClean="0">
+                <a:solidFill>
+                  <a:schemeClr val="bg1"/>
+                </a:solidFill>
+              </a:rPr>
+              <a:t> </a:t>
+            </a:r>
+            <a:r>
+              <a:rPr lang="en-US" dirty="0" err="1" smtClean="0">
+                <a:solidFill>
+                  <a:schemeClr val="bg1"/>
+                </a:solidFill>
+              </a:rPr>
+              <a:t>ruleze</a:t>
+            </a:r>
+            <a:r>
+              <a:rPr lang="en-US" dirty="0" smtClean="0">
+                <a:solidFill>
+                  <a:schemeClr val="bg1"/>
+                </a:solidFill>
+              </a:rPr>
+              <a:t> </a:t>
+            </a:r>
+            <a:r>
+              <a:rPr lang="en-US" dirty="0" err="1" smtClean="0">
+                <a:solidFill>
+                  <a:schemeClr val="bg1"/>
+                </a:solidFill>
+              </a:rPr>
+              <a:t>doar</a:t>
+            </a:r>
+            <a:r>
+              <a:rPr lang="en-US" dirty="0" smtClean="0">
+                <a:solidFill>
+                  <a:schemeClr val="bg1"/>
+                </a:solidFill>
+              </a:rPr>
+              <a:t> </a:t>
+            </a:r>
+            <a:r>
+              <a:rPr lang="en-US" dirty="0" err="1" smtClean="0">
+                <a:solidFill>
+                  <a:schemeClr val="bg1"/>
+                </a:solidFill>
+              </a:rPr>
+              <a:t>pe</a:t>
+            </a:r>
+            <a:r>
+              <a:rPr lang="en-US" dirty="0" smtClean="0">
+                <a:solidFill>
+                  <a:schemeClr val="bg1"/>
+                </a:solidFill>
+              </a:rPr>
+              <a:t> CPU, se </a:t>
+            </a:r>
+            <a:r>
+              <a:rPr lang="en-US" dirty="0" err="1" smtClean="0">
+                <a:solidFill>
+                  <a:schemeClr val="bg1"/>
+                </a:solidFill>
+              </a:rPr>
+              <a:t>comporta</a:t>
+            </a:r>
+            <a:r>
+              <a:rPr lang="en-US" dirty="0" smtClean="0">
+                <a:solidFill>
+                  <a:schemeClr val="bg1"/>
+                </a:solidFill>
+              </a:rPr>
+              <a:t> </a:t>
+            </a:r>
+            <a:r>
+              <a:rPr lang="en-US" dirty="0" err="1" smtClean="0">
+                <a:solidFill>
+                  <a:schemeClr val="bg1"/>
+                </a:solidFill>
+              </a:rPr>
+              <a:t>bine</a:t>
+            </a:r>
+            <a:r>
+              <a:rPr lang="en-US" dirty="0" smtClean="0">
+                <a:solidFill>
+                  <a:schemeClr val="bg1"/>
+                </a:solidFill>
+              </a:rPr>
+              <a:t> </a:t>
+            </a:r>
+            <a:r>
+              <a:rPr lang="en-US" dirty="0" err="1" smtClean="0">
+                <a:solidFill>
+                  <a:schemeClr val="bg1"/>
+                </a:solidFill>
+              </a:rPr>
+              <a:t>pe</a:t>
+            </a:r>
+            <a:r>
+              <a:rPr lang="en-US" dirty="0" smtClean="0">
+                <a:solidFill>
+                  <a:schemeClr val="bg1"/>
+                </a:solidFill>
+              </a:rPr>
+              <a:t> </a:t>
+            </a:r>
+            <a:r>
+              <a:rPr lang="en-US" dirty="0" err="1" smtClean="0">
+                <a:solidFill>
+                  <a:schemeClr val="bg1"/>
+                </a:solidFill>
+              </a:rPr>
+              <a:t>orice</a:t>
+            </a:r>
+            <a:r>
+              <a:rPr lang="en-US" dirty="0" smtClean="0">
+                <a:solidFill>
+                  <a:schemeClr val="bg1"/>
+                </a:solidFill>
+              </a:rPr>
+              <a:t> </a:t>
+            </a:r>
+            <a:r>
+              <a:rPr lang="en-US" dirty="0" err="1" smtClean="0">
+                <a:solidFill>
+                  <a:schemeClr val="bg1"/>
+                </a:solidFill>
+              </a:rPr>
+              <a:t>sistem</a:t>
+            </a:r>
+            <a:r>
+              <a:rPr lang="en-US" dirty="0" smtClean="0">
+                <a:solidFill>
+                  <a:schemeClr val="bg1"/>
+                </a:solidFill>
+              </a:rPr>
+              <a:t>.</a:t>
+            </a:r>
+          </a:p>
+          <a:p>
+            <a:r>
+              <a:rPr lang="en-US" dirty="0" err="1" smtClean="0">
+                <a:solidFill>
+                  <a:schemeClr val="bg1"/>
+                </a:solidFill>
+              </a:rPr>
+              <a:t>Pentru</a:t>
+            </a:r>
+            <a:r>
+              <a:rPr lang="en-US" dirty="0" smtClean="0">
+                <a:solidFill>
+                  <a:schemeClr val="bg1"/>
+                </a:solidFill>
+              </a:rPr>
+              <a:t> ca </a:t>
+            </a:r>
+            <a:r>
+              <a:rPr lang="en-US" dirty="0" err="1" smtClean="0">
+                <a:solidFill>
+                  <a:schemeClr val="bg1"/>
+                </a:solidFill>
+              </a:rPr>
+              <a:t>foloseste</a:t>
+            </a:r>
+            <a:r>
+              <a:rPr lang="en-US" dirty="0" smtClean="0">
+                <a:solidFill>
+                  <a:schemeClr val="bg1"/>
+                </a:solidFill>
+              </a:rPr>
+              <a:t> </a:t>
+            </a:r>
+            <a:r>
+              <a:rPr lang="en-US" dirty="0" err="1" smtClean="0">
+                <a:solidFill>
+                  <a:schemeClr val="bg1"/>
+                </a:solidFill>
+              </a:rPr>
+              <a:t>placa</a:t>
+            </a:r>
+            <a:r>
+              <a:rPr lang="en-US" dirty="0" smtClean="0">
+                <a:solidFill>
+                  <a:schemeClr val="bg1"/>
+                </a:solidFill>
+              </a:rPr>
+              <a:t> video, pot </a:t>
+            </a:r>
+            <a:r>
+              <a:rPr lang="en-US" dirty="0" err="1" smtClean="0">
+                <a:solidFill>
+                  <a:schemeClr val="bg1"/>
+                </a:solidFill>
+              </a:rPr>
+              <a:t>fi</a:t>
+            </a:r>
+            <a:r>
+              <a:rPr lang="en-US" dirty="0" smtClean="0">
+                <a:solidFill>
+                  <a:schemeClr val="bg1"/>
+                </a:solidFill>
+              </a:rPr>
+              <a:t> </a:t>
+            </a:r>
+            <a:r>
+              <a:rPr lang="en-US" dirty="0" err="1" smtClean="0">
+                <a:solidFill>
+                  <a:schemeClr val="bg1"/>
+                </a:solidFill>
+              </a:rPr>
+              <a:t>folosite</a:t>
+            </a:r>
+            <a:r>
+              <a:rPr lang="en-US" dirty="0" smtClean="0">
+                <a:solidFill>
+                  <a:schemeClr val="bg1"/>
+                </a:solidFill>
+              </a:rPr>
+              <a:t> </a:t>
+            </a:r>
+            <a:r>
+              <a:rPr lang="en-US" dirty="0" err="1" smtClean="0">
+                <a:solidFill>
+                  <a:schemeClr val="bg1"/>
+                </a:solidFill>
+              </a:rPr>
+              <a:t>programe</a:t>
+            </a:r>
+            <a:r>
+              <a:rPr lang="en-US" dirty="0" smtClean="0">
+                <a:solidFill>
+                  <a:schemeClr val="bg1"/>
+                </a:solidFill>
+              </a:rPr>
+              <a:t> de </a:t>
+            </a:r>
+            <a:r>
+              <a:rPr lang="en-US" dirty="0" err="1" smtClean="0">
+                <a:solidFill>
+                  <a:schemeClr val="bg1"/>
+                </a:solidFill>
+              </a:rPr>
+              <a:t>inregistrate</a:t>
+            </a:r>
+            <a:r>
+              <a:rPr lang="en-US" dirty="0" smtClean="0">
+                <a:solidFill>
+                  <a:schemeClr val="bg1"/>
+                </a:solidFill>
+              </a:rPr>
+              <a:t> </a:t>
+            </a:r>
+            <a:r>
+              <a:rPr lang="en-US" dirty="0" err="1" smtClean="0">
+                <a:solidFill>
+                  <a:schemeClr val="bg1"/>
+                </a:solidFill>
+              </a:rPr>
+              <a:t>si</a:t>
+            </a:r>
+            <a:r>
+              <a:rPr lang="en-US" dirty="0" smtClean="0">
+                <a:solidFill>
+                  <a:schemeClr val="bg1"/>
+                </a:solidFill>
+              </a:rPr>
+              <a:t> streaming ca </a:t>
+            </a:r>
+            <a:r>
+              <a:rPr lang="en-US" dirty="0" err="1" smtClean="0">
+                <a:solidFill>
+                  <a:schemeClr val="bg1"/>
+                </a:solidFill>
+              </a:rPr>
+              <a:t>Nvidia</a:t>
+            </a:r>
+            <a:r>
+              <a:rPr lang="en-US" dirty="0" smtClean="0">
+                <a:solidFill>
+                  <a:schemeClr val="bg1"/>
+                </a:solidFill>
+              </a:rPr>
+              <a:t> </a:t>
+            </a:r>
+            <a:r>
+              <a:rPr lang="en-US" dirty="0" err="1" smtClean="0">
+                <a:solidFill>
+                  <a:schemeClr val="bg1"/>
+                </a:solidFill>
+              </a:rPr>
+              <a:t>GeForce</a:t>
+            </a:r>
+            <a:r>
+              <a:rPr lang="en-US" dirty="0" smtClean="0">
+                <a:solidFill>
+                  <a:schemeClr val="bg1"/>
+                </a:solidFill>
+              </a:rPr>
+              <a:t> Experience.</a:t>
             </a:r>
             <a:endParaRPr lang="ro-RO" dirty="0">
               <a:solidFill>
@@ -8454,6 +8992,525 @@
 </file>
 
 <file path=ppt/slides/slide39.xml><?xml version="1.0" encoding="utf-8"?>
+<p:sld xmlns:a="http://schemas.openxmlformats.org/drawingml/2006/main" xmlns:r="http://schemas.openxmlformats.org/officeDocument/2006/relationships" xmlns:p="http://schemas.openxmlformats.org/presentationml/2006/main">
+  <p:cSld>
+    <p:spTree>
+      <p:nvGrpSpPr>
+        <p:cNvPr id="1" name=""/>
+        <p:cNvGrpSpPr/>
+        <p:nvPr/>
+      </p:nvGrpSpPr>
+      <p:grpSpPr>
+        <a:xfrm>
+          <a:off x="0" y="0"/>
+          <a:ext cx="0" cy="0"/>
+          <a:chOff x="0" y="0"/>
+          <a:chExt cx="0" cy="0"/>
+        </a:xfrm>
+      </p:grpSpPr>
+      <p:sp>
+        <p:nvSpPr>
+          <p:cNvPr id="2" name="Title 1"/>
+          <p:cNvSpPr>
+            <a:spLocks noGrp="1"/>
+          </p:cNvSpPr>
+          <p:nvPr>
+            <p:ph type="title"/>
+          </p:nvPr>
+        </p:nvSpPr>
+        <p:spPr/>
+        <p:txBody>
+          <a:bodyPr/>
+          <a:lstStyle/>
+          <a:p>
+            <a:r>
+              <a:rPr lang="ro-RO" dirty="0" smtClean="0">
+                <a:solidFill>
+                  <a:schemeClr val="bg1"/>
+                </a:solidFill>
+              </a:rPr>
+              <a:t>Pixel Retro Games</a:t>
+            </a:r>
+            <a:endParaRPr lang="ro-RO" dirty="0">
+              <a:solidFill>
+                <a:schemeClr val="bg1"/>
+              </a:solidFill>
+            </a:endParaRPr>
+          </a:p>
+        </p:txBody>
+      </p:sp>
+      <p:sp>
+        <p:nvSpPr>
+          <p:cNvPr id="3" name="Content Placeholder 2"/>
+          <p:cNvSpPr>
+            <a:spLocks noGrp="1"/>
+          </p:cNvSpPr>
+          <p:nvPr>
+            <p:ph idx="1"/>
+          </p:nvPr>
+        </p:nvSpPr>
+        <p:spPr/>
+        <p:txBody>
+          <a:bodyPr/>
+          <a:lstStyle/>
+          <a:p>
+            <a:r>
+              <a:rPr lang="ro-RO" dirty="0" smtClean="0">
+                <a:solidFill>
+                  <a:schemeClr val="bg1"/>
+                </a:solidFill>
+              </a:rPr>
+              <a:t>În cadrul acestui proiect promovăm jocurile retro care nu consumă multe resurse, sunt distractive și dispun de un grad ridicat de calitatate. Pixel World este optimizat la extrem, pentru a minimiza cerințele de rulare. Cum jocurile de tip RPG sunt cele mai complexe și mai interesante, numele echipei conține aceste inițiale dar în alta ordine(PRG).</a:t>
+            </a:r>
+          </a:p>
+          <a:p>
+            <a:endParaRPr lang="ro-RO" dirty="0">
+              <a:solidFill>
+                <a:schemeClr val="bg1"/>
+              </a:solidFill>
+            </a:endParaRPr>
+          </a:p>
+        </p:txBody>
+      </p:sp>
+    </p:spTree>
+  </p:cSld>
+  <p:clrMapOvr>
+    <a:masterClrMapping/>
+  </p:clrMapOvr>
+  <p:timing>
+    <p:tnLst>
+      <p:par>
+        <p:cTn id="1" dur="indefinite" restart="never" nodeType="tmRoot"/>
+      </p:par>
+    </p:tnLst>
+  </p:timing>
+</p:sld>
+</file>
+
+<file path=ppt/slides/slide4.xml><?xml version="1.0" encoding="utf-8"?>
+<p:sld xmlns:a="http://schemas.openxmlformats.org/drawingml/2006/main" xmlns:r="http://schemas.openxmlformats.org/officeDocument/2006/relationships" xmlns:p="http://schemas.openxmlformats.org/presentationml/2006/main">
+  <p:cSld>
+    <p:spTree>
+      <p:nvGrpSpPr>
+        <p:cNvPr id="1" name=""/>
+        <p:cNvGrpSpPr/>
+        <p:nvPr/>
+      </p:nvGrpSpPr>
+      <p:grpSpPr>
+        <a:xfrm>
+          <a:off x="0" y="0"/>
+          <a:ext cx="0" cy="0"/>
+          <a:chOff x="0" y="0"/>
+          <a:chExt cx="0" cy="0"/>
+        </a:xfrm>
+      </p:grpSpPr>
+      <p:sp>
+        <p:nvSpPr>
+          <p:cNvPr id="2" name="Title 1"/>
+          <p:cNvSpPr>
+            <a:spLocks noGrp="1"/>
+          </p:cNvSpPr>
+          <p:nvPr>
+            <p:ph type="title"/>
+          </p:nvPr>
+        </p:nvSpPr>
+        <p:spPr/>
+        <p:txBody>
+          <a:bodyPr/>
+          <a:lstStyle/>
+          <a:p>
+            <a:r>
+              <a:rPr lang="ro-RO" dirty="0" smtClean="0">
+                <a:solidFill>
+                  <a:schemeClr val="bg1"/>
+                </a:solidFill>
+              </a:rPr>
+              <a:t>Arhitectura</a:t>
+            </a:r>
+            <a:endParaRPr lang="ro-RO" dirty="0">
+              <a:solidFill>
+                <a:schemeClr val="bg1"/>
+              </a:solidFill>
+            </a:endParaRPr>
+          </a:p>
+        </p:txBody>
+      </p:sp>
+      <p:sp>
+        <p:nvSpPr>
+          <p:cNvPr id="3" name="Content Placeholder 2"/>
+          <p:cNvSpPr>
+            <a:spLocks noGrp="1"/>
+          </p:cNvSpPr>
+          <p:nvPr>
+            <p:ph idx="1"/>
+          </p:nvPr>
+        </p:nvSpPr>
+        <p:spPr/>
+        <p:txBody>
+          <a:bodyPr>
+            <a:normAutofit lnSpcReduction="10000"/>
+          </a:bodyPr>
+          <a:lstStyle/>
+          <a:p>
+            <a:r>
+              <a:rPr lang="ro-RO" dirty="0" smtClean="0">
+                <a:solidFill>
+                  <a:schemeClr val="bg1"/>
+                </a:solidFill>
+              </a:rPr>
+              <a:t>Acest proiect a fost creat pe module: Shop, Menu, Duel Mode, Script Interpreter, Launcher.</a:t>
+            </a:r>
+          </a:p>
+          <a:p>
+            <a:r>
+              <a:rPr lang="ro-RO" dirty="0" smtClean="0">
+                <a:solidFill>
+                  <a:schemeClr val="bg1"/>
+                </a:solidFill>
+              </a:rPr>
+              <a:t>Fiecare modul este compus din mai multe clase, fiecărei clase fiindu-i atribuite anumite sarcini, totul fiind scris de la zero.</a:t>
+            </a:r>
+          </a:p>
+          <a:p>
+            <a:r>
+              <a:rPr lang="ro-RO" dirty="0" smtClean="0">
+                <a:solidFill>
+                  <a:schemeClr val="bg1"/>
+                </a:solidFill>
+              </a:rPr>
+              <a:t>Codul este ușor de modificat, elegant, respectând regulile din “The Pragmatic Programmer”.</a:t>
+            </a:r>
+            <a:endParaRPr lang="ro-RO" dirty="0">
+              <a:solidFill>
+                <a:schemeClr val="bg1"/>
+              </a:solidFill>
+            </a:endParaRPr>
+          </a:p>
+        </p:txBody>
+      </p:sp>
+    </p:spTree>
+  </p:cSld>
+  <p:clrMapOvr>
+    <a:masterClrMapping/>
+  </p:clrMapOvr>
+  <p:timing>
+    <p:tnLst>
+      <p:par>
+        <p:cTn id="1" dur="indefinite" restart="never" nodeType="tmRoot"/>
+      </p:par>
+    </p:tnLst>
+  </p:timing>
+</p:sld>
+</file>
+
+<file path=ppt/slides/slide40.xml><?xml version="1.0" encoding="utf-8"?>
+<p:sld xmlns:a="http://schemas.openxmlformats.org/drawingml/2006/main" xmlns:r="http://schemas.openxmlformats.org/officeDocument/2006/relationships" xmlns:p="http://schemas.openxmlformats.org/presentationml/2006/main">
+  <p:cSld>
+    <p:spTree>
+      <p:nvGrpSpPr>
+        <p:cNvPr id="1" name=""/>
+        <p:cNvGrpSpPr/>
+        <p:nvPr/>
+      </p:nvGrpSpPr>
+      <p:grpSpPr>
+        <a:xfrm>
+          <a:off x="0" y="0"/>
+          <a:ext cx="0" cy="0"/>
+          <a:chOff x="0" y="0"/>
+          <a:chExt cx="0" cy="0"/>
+        </a:xfrm>
+      </p:grpSpPr>
+      <p:sp>
+        <p:nvSpPr>
+          <p:cNvPr id="2" name="Title 1"/>
+          <p:cNvSpPr>
+            <a:spLocks noGrp="1"/>
+          </p:cNvSpPr>
+          <p:nvPr>
+            <p:ph type="title"/>
+          </p:nvPr>
+        </p:nvSpPr>
+        <p:spPr/>
+        <p:txBody>
+          <a:bodyPr/>
+          <a:lstStyle/>
+          <a:p>
+            <a:r>
+              <a:rPr lang="ro-RO" dirty="0" smtClean="0">
+                <a:solidFill>
+                  <a:schemeClr val="bg1"/>
+                </a:solidFill>
+              </a:rPr>
+              <a:t>De ce nu Unity?</a:t>
+            </a:r>
+            <a:endParaRPr lang="ro-RO" dirty="0">
+              <a:solidFill>
+                <a:schemeClr val="bg1"/>
+              </a:solidFill>
+            </a:endParaRPr>
+          </a:p>
+        </p:txBody>
+      </p:sp>
+      <p:sp>
+        <p:nvSpPr>
+          <p:cNvPr id="3" name="Content Placeholder 2"/>
+          <p:cNvSpPr>
+            <a:spLocks noGrp="1"/>
+          </p:cNvSpPr>
+          <p:nvPr>
+            <p:ph idx="1"/>
+          </p:nvPr>
+        </p:nvSpPr>
+        <p:spPr/>
+        <p:txBody>
+          <a:bodyPr>
+            <a:normAutofit lnSpcReduction="10000"/>
+          </a:bodyPr>
+          <a:lstStyle/>
+          <a:p>
+            <a:r>
+              <a:rPr lang="ro-RO" dirty="0" smtClean="0">
+                <a:solidFill>
+                  <a:schemeClr val="bg1"/>
+                </a:solidFill>
+              </a:rPr>
+              <a:t>Pentru a dezvolta acest joc am folosit C++ și SDL1.2. De ce? Pentru ca un joc 2D nu are nevoie de un engine prefabricat ci poate fi scris odată cu jocul. Pentru că C++ este rapid și oferă programare orientată obiect. Pentru că această combinație de tehnologii este ușor de portat și întreținut, iar scrierea aplicației este înca interesantă, fiind nevoit să scriu cod, nu să folosesc tehnici Drag and Drop ca în alte engine-uri.</a:t>
+            </a:r>
+            <a:endParaRPr lang="ro-RO" dirty="0">
+              <a:solidFill>
+                <a:schemeClr val="bg1"/>
+              </a:solidFill>
+            </a:endParaRPr>
+          </a:p>
+        </p:txBody>
+      </p:sp>
+    </p:spTree>
+  </p:cSld>
+  <p:clrMapOvr>
+    <a:masterClrMapping/>
+  </p:clrMapOvr>
+</p:sld>
+</file>
+
+<file path=ppt/slides/slide41.xml><?xml version="1.0" encoding="utf-8"?>
+<p:sld xmlns:a="http://schemas.openxmlformats.org/drawingml/2006/main" xmlns:r="http://schemas.openxmlformats.org/officeDocument/2006/relationships" xmlns:p="http://schemas.openxmlformats.org/presentationml/2006/main">
+  <p:cSld>
+    <p:spTree>
+      <p:nvGrpSpPr>
+        <p:cNvPr id="1" name=""/>
+        <p:cNvGrpSpPr/>
+        <p:nvPr/>
+      </p:nvGrpSpPr>
+      <p:grpSpPr>
+        <a:xfrm>
+          <a:off x="0" y="0"/>
+          <a:ext cx="0" cy="0"/>
+          <a:chOff x="0" y="0"/>
+          <a:chExt cx="0" cy="0"/>
+        </a:xfrm>
+      </p:grpSpPr>
+      <p:sp>
+        <p:nvSpPr>
+          <p:cNvPr id="2" name="Title 1"/>
+          <p:cNvSpPr>
+            <a:spLocks noGrp="1"/>
+          </p:cNvSpPr>
+          <p:nvPr>
+            <p:ph type="title"/>
+          </p:nvPr>
+        </p:nvSpPr>
+        <p:spPr/>
+        <p:txBody>
+          <a:bodyPr/>
+          <a:lstStyle/>
+          <a:p>
+            <a:r>
+              <a:rPr lang="ro-RO" dirty="0" smtClean="0">
+                <a:solidFill>
+                  <a:schemeClr val="bg1"/>
+                </a:solidFill>
+              </a:rPr>
+              <a:t>De ce?</a:t>
+            </a:r>
+            <a:endParaRPr lang="ro-RO" dirty="0">
+              <a:solidFill>
+                <a:schemeClr val="bg1"/>
+              </a:solidFill>
+            </a:endParaRPr>
+          </a:p>
+        </p:txBody>
+      </p:sp>
+      <p:sp>
+        <p:nvSpPr>
+          <p:cNvPr id="3" name="Content Placeholder 2"/>
+          <p:cNvSpPr>
+            <a:spLocks noGrp="1"/>
+          </p:cNvSpPr>
+          <p:nvPr>
+            <p:ph idx="1"/>
+          </p:nvPr>
+        </p:nvSpPr>
+        <p:spPr/>
+        <p:txBody>
+          <a:bodyPr>
+            <a:normAutofit fontScale="85000" lnSpcReduction="10000"/>
+          </a:bodyPr>
+          <a:lstStyle/>
+          <a:p>
+            <a:r>
+              <a:rPr lang="ro-RO" dirty="0" smtClean="0">
+                <a:solidFill>
+                  <a:schemeClr val="bg1"/>
+                </a:solidFill>
+              </a:rPr>
+              <a:t>Acest joc este creat pentru persoanele care apreciază jocurile retro și sunt dornice să exploreze o lume virtuala plină de provocări. Cerințele de rulare sunt minime, așa că poate fi portat pe sisteme mobile (Android, IOS, Nintendo Switch, etc.).</a:t>
+            </a:r>
+          </a:p>
+          <a:p>
+            <a:r>
+              <a:rPr lang="ro-RO" dirty="0" smtClean="0">
+                <a:solidFill>
+                  <a:schemeClr val="bg1"/>
+                </a:solidFill>
+              </a:rPr>
+              <a:t>Convingerea mea este că acest joc și-a atins scopul: poate spune o poveste complexă fară a deveni repetitiv, prezentând elemente diverse (lupte, puzzle-uri,dialoguri,etc.). Elementele vizuale și auditive sunt calitative și oferă o experiența unica jucătorului.</a:t>
+            </a:r>
+            <a:endParaRPr lang="ro-RO" dirty="0">
+              <a:solidFill>
+                <a:schemeClr val="bg1"/>
+              </a:solidFill>
+            </a:endParaRPr>
+          </a:p>
+        </p:txBody>
+      </p:sp>
+    </p:spTree>
+  </p:cSld>
+  <p:clrMapOvr>
+    <a:masterClrMapping/>
+  </p:clrMapOvr>
+</p:sld>
+</file>
+
+<file path=ppt/slides/slide42.xml><?xml version="1.0" encoding="utf-8"?>
+<p:sld xmlns:a="http://schemas.openxmlformats.org/drawingml/2006/main" xmlns:r="http://schemas.openxmlformats.org/officeDocument/2006/relationships" xmlns:p="http://schemas.openxmlformats.org/presentationml/2006/main">
+  <p:cSld>
+    <p:spTree>
+      <p:nvGrpSpPr>
+        <p:cNvPr id="1" name=""/>
+        <p:cNvGrpSpPr/>
+        <p:nvPr/>
+      </p:nvGrpSpPr>
+      <p:grpSpPr>
+        <a:xfrm>
+          <a:off x="0" y="0"/>
+          <a:ext cx="0" cy="0"/>
+          <a:chOff x="0" y="0"/>
+          <a:chExt cx="0" cy="0"/>
+        </a:xfrm>
+      </p:grpSpPr>
+      <p:sp>
+        <p:nvSpPr>
+          <p:cNvPr id="2" name="Title 1"/>
+          <p:cNvSpPr>
+            <a:spLocks noGrp="1"/>
+          </p:cNvSpPr>
+          <p:nvPr>
+            <p:ph type="title"/>
+          </p:nvPr>
+        </p:nvSpPr>
+        <p:spPr/>
+        <p:txBody>
+          <a:bodyPr/>
+          <a:lstStyle/>
+          <a:p>
+            <a:r>
+              <a:rPr lang="ro-RO" dirty="0" smtClean="0">
+                <a:solidFill>
+                  <a:schemeClr val="bg1"/>
+                </a:solidFill>
+              </a:rPr>
+              <a:t>Ghid de instalare</a:t>
+            </a:r>
+            <a:endParaRPr lang="ro-RO" dirty="0">
+              <a:solidFill>
+                <a:schemeClr val="bg1"/>
+              </a:solidFill>
+            </a:endParaRPr>
+          </a:p>
+        </p:txBody>
+      </p:sp>
+      <p:sp>
+        <p:nvSpPr>
+          <p:cNvPr id="3" name="Content Placeholder 2"/>
+          <p:cNvSpPr>
+            <a:spLocks noGrp="1"/>
+          </p:cNvSpPr>
+          <p:nvPr>
+            <p:ph idx="1"/>
+          </p:nvPr>
+        </p:nvSpPr>
+        <p:spPr/>
+        <p:txBody>
+          <a:bodyPr>
+            <a:normAutofit fontScale="85000" lnSpcReduction="20000"/>
+          </a:bodyPr>
+          <a:lstStyle/>
+          <a:p>
+            <a:r>
+              <a:rPr lang="ro-RO" dirty="0" smtClean="0">
+                <a:solidFill>
+                  <a:schemeClr val="bg1"/>
+                </a:solidFill>
+              </a:rPr>
+              <a:t>Această versiune de joc a fost testată doar pe Windows 10. Se recomandă cel puțin 500 mb de RAM și un procesor de cel puțin 1,5-2 Ghz.</a:t>
+            </a:r>
+          </a:p>
+          <a:p>
+            <a:r>
+              <a:rPr lang="ro-RO" dirty="0" smtClean="0">
+                <a:solidFill>
+                  <a:schemeClr val="bg1"/>
+                </a:solidFill>
+              </a:rPr>
+              <a:t>Instalarea este foarte ușoara. Tot ce trebuie făcut este să fie dezarhivat proiectul în orice locație, iar pentru a porni jocul se va folosi Launcher.exe din folder-ul principal.</a:t>
+            </a:r>
+          </a:p>
+          <a:p>
+            <a:r>
+              <a:rPr lang="ro-RO" dirty="0" smtClean="0">
+                <a:solidFill>
+                  <a:schemeClr val="bg1"/>
+                </a:solidFill>
+              </a:rPr>
+              <a:t>În cazul în care setările au fost modificate, iar acum programul nu mai pornește, lansați reset-settings.bat.</a:t>
+            </a:r>
+          </a:p>
+          <a:p>
+            <a:r>
+              <a:rPr lang="ro-RO" dirty="0" smtClean="0">
+                <a:solidFill>
+                  <a:schemeClr val="bg1"/>
+                </a:solidFill>
+              </a:rPr>
+              <a:t>Pentru a reseta salvările folosiți reset-saves.bat, iar pentru a schimba salvarea curentă cu una cu bani mai mulți, folosiți money.bat.</a:t>
+            </a:r>
+            <a:endParaRPr lang="ro-RO" dirty="0">
+              <a:solidFill>
+                <a:schemeClr val="bg1"/>
+              </a:solidFill>
+            </a:endParaRPr>
+          </a:p>
+        </p:txBody>
+      </p:sp>
+    </p:spTree>
+  </p:cSld>
+  <p:clrMapOvr>
+    <a:masterClrMapping/>
+  </p:clrMapOvr>
+</p:sld>
+</file>
+
+<file path=ppt/slides/slide43.xml><?xml version="1.0" encoding="utf-8"?>
 <p:sld xmlns:a="http://schemas.openxmlformats.org/drawingml/2006/main" xmlns:r="http://schemas.openxmlformats.org/officeDocument/2006/relationships" xmlns:p="http://schemas.openxmlformats.org/presentationml/2006/main">
   <p:cSld>
     <p:spTree>
@@ -8688,138 +9745,6 @@
 </p:sld>
 </file>
 
-<file path=ppt/slides/slide4.xml><?xml version="1.0" encoding="utf-8"?>
-<p:sld xmlns:a="http://schemas.openxmlformats.org/drawingml/2006/main" xmlns:r="http://schemas.openxmlformats.org/officeDocument/2006/relationships" xmlns:p="http://schemas.openxmlformats.org/presentationml/2006/main">
-  <p:cSld>
-    <p:spTree>
-      <p:nvGrpSpPr>
-        <p:cNvPr id="1" name=""/>
-        <p:cNvGrpSpPr/>
-        <p:nvPr/>
-      </p:nvGrpSpPr>
-      <p:grpSpPr>
-        <a:xfrm>
-          <a:off x="0" y="0"/>
-          <a:ext cx="0" cy="0"/>
-          <a:chOff x="0" y="0"/>
-          <a:chExt cx="0" cy="0"/>
-        </a:xfrm>
-      </p:grpSpPr>
-      <p:sp>
-        <p:nvSpPr>
-          <p:cNvPr id="2" name="Title 1"/>
-          <p:cNvSpPr>
-            <a:spLocks noGrp="1"/>
-          </p:cNvSpPr>
-          <p:nvPr>
-            <p:ph type="title"/>
-          </p:nvPr>
-        </p:nvSpPr>
-        <p:spPr/>
-        <p:txBody>
-          <a:bodyPr/>
-          <a:lstStyle/>
-          <a:p>
-            <a:r>
-              <a:rPr lang="ro-RO" dirty="0" smtClean="0">
-                <a:solidFill>
-                  <a:schemeClr val="bg1"/>
-                </a:solidFill>
-              </a:rPr>
-              <a:t>Arhitectura</a:t>
-            </a:r>
-            <a:endParaRPr lang="ro-RO" dirty="0">
-              <a:solidFill>
-                <a:schemeClr val="bg1"/>
-              </a:solidFill>
-            </a:endParaRPr>
-          </a:p>
-        </p:txBody>
-      </p:sp>
-      <p:sp>
-        <p:nvSpPr>
-          <p:cNvPr id="3" name="Content Placeholder 2"/>
-          <p:cNvSpPr>
-            <a:spLocks noGrp="1"/>
-          </p:cNvSpPr>
-          <p:nvPr>
-            <p:ph idx="1"/>
-          </p:nvPr>
-        </p:nvSpPr>
-        <p:spPr/>
-        <p:txBody>
-          <a:bodyPr>
-            <a:normAutofit lnSpcReduction="10000"/>
-          </a:bodyPr>
-          <a:lstStyle/>
-          <a:p>
-            <a:r>
-              <a:rPr lang="ro-RO" dirty="0" smtClean="0">
-                <a:solidFill>
-                  <a:schemeClr val="bg1"/>
-                </a:solidFill>
-              </a:rPr>
-              <a:t>Acest proiect a fost creat pe module: Shop, Menu, Duel Mode, Script Interpreter, Launcher.</a:t>
-            </a:r>
-          </a:p>
-          <a:p>
-            <a:r>
-              <a:rPr lang="ro-RO" dirty="0" smtClean="0">
-                <a:solidFill>
-                  <a:schemeClr val="bg1"/>
-                </a:solidFill>
-              </a:rPr>
-              <a:t>Fiecare modul este compus din mai multe clase, fiecărei clase fiindu-i atribuite anumite </a:t>
-            </a:r>
-            <a:r>
-              <a:rPr lang="ro-RO" dirty="0" smtClean="0">
-                <a:solidFill>
-                  <a:schemeClr val="bg1"/>
-                </a:solidFill>
-              </a:rPr>
-              <a:t>sarcini, totul </a:t>
-            </a:r>
-            <a:r>
-              <a:rPr lang="ro-RO" dirty="0" smtClean="0">
-                <a:solidFill>
-                  <a:schemeClr val="bg1"/>
-                </a:solidFill>
-              </a:rPr>
-              <a:t>fiind scris de la zero.</a:t>
-            </a:r>
-          </a:p>
-          <a:p>
-            <a:r>
-              <a:rPr lang="ro-RO" dirty="0" smtClean="0">
-                <a:solidFill>
-                  <a:schemeClr val="bg1"/>
-                </a:solidFill>
-              </a:rPr>
-              <a:t>Codul este ușor de modificat, elegant, respectând regulile din “The Pragmatic Programmer”.</a:t>
-            </a:r>
-            <a:endParaRPr lang="ro-RO" dirty="0">
-              <a:solidFill>
-                <a:schemeClr val="bg1"/>
-              </a:solidFill>
-            </a:endParaRPr>
-          </a:p>
-        </p:txBody>
-      </p:sp>
-    </p:spTree>
-  </p:cSld>
-  <p:clrMapOvr>
-    <a:masterClrMapping/>
-  </p:clrMapOvr>
-  <p:timing>
-    <p:tnLst>
-      <p:par>
-        <p:cTn id="1" dur="indefinite" restart="never" nodeType="tmRoot"/>
-      </p:par>
-    </p:tnLst>
-  </p:timing>
-</p:sld>
-</file>
-
 <file path=ppt/slides/slide5.xml><?xml version="1.0" encoding="utf-8"?>
 <p:sld xmlns:a="http://schemas.openxmlformats.org/drawingml/2006/main" xmlns:r="http://schemas.openxmlformats.org/officeDocument/2006/relationships" xmlns:p="http://schemas.openxmlformats.org/presentationml/2006/main">
   <p:cSld>
@@ -8881,7 +9806,7 @@
         <p:spPr/>
         <p:txBody>
           <a:bodyPr>
-            <a:normAutofit lnSpcReduction="10000"/>
+            <a:normAutofit/>
           </a:bodyPr>
           <a:lstStyle/>
           <a:p>
@@ -8891,17 +9816,47 @@
                   <a:schemeClr val="bg1"/>
                 </a:solidFill>
               </a:rPr>
-              <a:t>Cum accentul cade pe gameplay și mai puțin pe grafică, SDL1.2 a fost biblioteca perfectă pentru a susține acest proiect.</a:t>
-            </a:r>
-          </a:p>
-          <a:p>
+              <a:t>Codul este</a:t>
+            </a:r>
+            <a:r>
+              <a:rPr lang="en-US" dirty="0" smtClean="0">
+                <a:solidFill>
+                  <a:schemeClr val="bg1"/>
+                </a:solidFill>
+              </a:rPr>
+              <a:t> </a:t>
+            </a:r>
+            <a:r>
+              <a:rPr lang="en-US" dirty="0" err="1" smtClean="0">
+                <a:solidFill>
+                  <a:schemeClr val="bg1"/>
+                </a:solidFill>
+              </a:rPr>
+              <a:t>scris</a:t>
+            </a:r>
             <a:r>
               <a:rPr lang="ro-RO" dirty="0" smtClean="0">
                 <a:solidFill>
                   <a:schemeClr val="bg1"/>
                 </a:solidFill>
               </a:rPr>
-              <a:t>Codul este în C++, folosindu-se de SDL1.2 doar pentru manipularerea multimedia. Pentru a avea mai mult control am ales să îmi scriu propriul engine și să nu folosesc unul deja existent(Unity, Unreal).</a:t>
+              <a:t> în C++, folosindu-se de SDL</a:t>
+            </a:r>
+            <a:r>
+              <a:rPr lang="en-US" dirty="0" smtClean="0">
+                <a:solidFill>
+                  <a:schemeClr val="bg1"/>
+                </a:solidFill>
+              </a:rPr>
+              <a:t> </a:t>
+            </a:r>
+            <a:r>
+              <a:rPr lang="ro-RO" dirty="0" smtClean="0">
+                <a:solidFill>
+                  <a:schemeClr val="bg1"/>
+                </a:solidFill>
+              </a:rPr>
+              <a:t>2 doar pentru manipularerea multimedia. Pentru a avea mai mult control am ales să îmi scriu propriul engine și să nu folosesc unul deja existent(Unity, Unreal).</a:t>
             </a:r>
           </a:p>
           <a:p>
@@ -9005,33 +9960,7 @@
                   <a:schemeClr val="bg1"/>
                 </a:solidFill>
               </a:rPr>
-              <a:t>Pixel World: The Cursed Dungeon poate fi portat pe Linux și Mac cu modificări minime în cod, fiind </a:t>
-            </a:r>
-            <a:r>
-              <a:rPr lang="ro-RO" dirty="0" smtClean="0">
-                <a:solidFill>
-                  <a:schemeClr val="bg1"/>
-                </a:solidFill>
-              </a:rPr>
-              <a:t>necesară </a:t>
-            </a:r>
-            <a:r>
-              <a:rPr lang="ro-RO" dirty="0" smtClean="0">
-                <a:solidFill>
-                  <a:schemeClr val="bg1"/>
-                </a:solidFill>
-              </a:rPr>
-              <a:t>doar o compilare adecvată pentru aceste sisteme de operare.</a:t>
-            </a:r>
-          </a:p>
-          <a:p>
-            <a:r>
-              <a:rPr lang="ro-RO" dirty="0" smtClean="0">
-                <a:solidFill>
-                  <a:schemeClr val="bg1"/>
-                </a:solidFill>
-              </a:rPr>
-              <a:t>Un pas urmator este portarea pe SDL2(s-au facut optimizări), lucru care va permite mai departe portarea pe Android și IOS, repet, schimbările în cod fiind minime.</a:t>
+              <a:t>Pixel World: The Cursed Dungeon poate fi portat pe Linux și Mac cu modificări minime în cod, fiind necesară doar o compilare adecvată pentru aceste sisteme de operare.</a:t>
             </a:r>
           </a:p>
         </p:txBody>

</xml_diff>